<commit_message>
schematic and perforated board in progress
</commit_message>
<xml_diff>
--- a/universalPanelAdapter.pptx
+++ b/universalPanelAdapter.pptx
@@ -5,11 +5,15 @@
     <p:sldMasterId id="2147483648" r:id="rId1"/>
   </p:sldMasterIdLst>
   <p:notesMasterIdLst>
-    <p:notesMasterId r:id="rId4"/>
+    <p:notesMasterId r:id="rId8"/>
   </p:notesMasterIdLst>
   <p:sldIdLst>
     <p:sldId id="351" r:id="rId2"/>
-    <p:sldId id="352" r:id="rId3"/>
+    <p:sldId id="356" r:id="rId3"/>
+    <p:sldId id="353" r:id="rId4"/>
+    <p:sldId id="352" r:id="rId5"/>
+    <p:sldId id="354" r:id="rId6"/>
+    <p:sldId id="355" r:id="rId7"/>
   </p:sldIdLst>
   <p:sldSz cx="12192000" cy="6858000"/>
   <p:notesSz cx="6858000" cy="9144000"/>
@@ -210,7 +214,7 @@
           <a:p>
             <a:fld id="{610D8019-0F12-41ED-BD47-D9924B5D4D5A}" type="datetimeFigureOut">
               <a:rPr lang="en-GB" smtClean="0"/>
-              <a:t>16/05/2020</a:t>
+              <a:t>22/05/2020</a:t>
             </a:fld>
             <a:endParaRPr lang="en-GB"/>
           </a:p>
@@ -609,7 +613,7 @@
           <a:p>
             <a:fld id="{E3393631-F887-443B-9989-5D612862E36C}" type="datetimeFigureOut">
               <a:rPr lang="en-GB" smtClean="0"/>
-              <a:t>16/05/2020</a:t>
+              <a:t>22/05/2020</a:t>
             </a:fld>
             <a:endParaRPr lang="en-GB"/>
           </a:p>
@@ -779,7 +783,7 @@
           <a:p>
             <a:fld id="{E3393631-F887-443B-9989-5D612862E36C}" type="datetimeFigureOut">
               <a:rPr lang="en-GB" smtClean="0"/>
-              <a:t>16/05/2020</a:t>
+              <a:t>22/05/2020</a:t>
             </a:fld>
             <a:endParaRPr lang="en-GB"/>
           </a:p>
@@ -959,7 +963,7 @@
           <a:p>
             <a:fld id="{E3393631-F887-443B-9989-5D612862E36C}" type="datetimeFigureOut">
               <a:rPr lang="en-GB" smtClean="0"/>
-              <a:t>16/05/2020</a:t>
+              <a:t>22/05/2020</a:t>
             </a:fld>
             <a:endParaRPr lang="en-GB"/>
           </a:p>
@@ -1129,7 +1133,7 @@
           <a:p>
             <a:fld id="{E3393631-F887-443B-9989-5D612862E36C}" type="datetimeFigureOut">
               <a:rPr lang="en-GB" smtClean="0"/>
-              <a:t>16/05/2020</a:t>
+              <a:t>22/05/2020</a:t>
             </a:fld>
             <a:endParaRPr lang="en-GB"/>
           </a:p>
@@ -1375,7 +1379,7 @@
           <a:p>
             <a:fld id="{E3393631-F887-443B-9989-5D612862E36C}" type="datetimeFigureOut">
               <a:rPr lang="en-GB" smtClean="0"/>
-              <a:t>16/05/2020</a:t>
+              <a:t>22/05/2020</a:t>
             </a:fld>
             <a:endParaRPr lang="en-GB"/>
           </a:p>
@@ -1607,7 +1611,7 @@
           <a:p>
             <a:fld id="{E3393631-F887-443B-9989-5D612862E36C}" type="datetimeFigureOut">
               <a:rPr lang="en-GB" smtClean="0"/>
-              <a:t>16/05/2020</a:t>
+              <a:t>22/05/2020</a:t>
             </a:fld>
             <a:endParaRPr lang="en-GB"/>
           </a:p>
@@ -1974,7 +1978,7 @@
           <a:p>
             <a:fld id="{E3393631-F887-443B-9989-5D612862E36C}" type="datetimeFigureOut">
               <a:rPr lang="en-GB" smtClean="0"/>
-              <a:t>16/05/2020</a:t>
+              <a:t>22/05/2020</a:t>
             </a:fld>
             <a:endParaRPr lang="en-GB"/>
           </a:p>
@@ -2092,7 +2096,7 @@
           <a:p>
             <a:fld id="{E3393631-F887-443B-9989-5D612862E36C}" type="datetimeFigureOut">
               <a:rPr lang="en-GB" smtClean="0"/>
-              <a:t>16/05/2020</a:t>
+              <a:t>22/05/2020</a:t>
             </a:fld>
             <a:endParaRPr lang="en-GB"/>
           </a:p>
@@ -2187,7 +2191,7 @@
           <a:p>
             <a:fld id="{E3393631-F887-443B-9989-5D612862E36C}" type="datetimeFigureOut">
               <a:rPr lang="en-GB" smtClean="0"/>
-              <a:t>16/05/2020</a:t>
+              <a:t>22/05/2020</a:t>
             </a:fld>
             <a:endParaRPr lang="en-GB"/>
           </a:p>
@@ -2464,7 +2468,7 @@
           <a:p>
             <a:fld id="{E3393631-F887-443B-9989-5D612862E36C}" type="datetimeFigureOut">
               <a:rPr lang="en-GB" smtClean="0"/>
-              <a:t>16/05/2020</a:t>
+              <a:t>22/05/2020</a:t>
             </a:fld>
             <a:endParaRPr lang="en-GB"/>
           </a:p>
@@ -2717,7 +2721,7 @@
           <a:p>
             <a:fld id="{E3393631-F887-443B-9989-5D612862E36C}" type="datetimeFigureOut">
               <a:rPr lang="en-GB" smtClean="0"/>
-              <a:t>16/05/2020</a:t>
+              <a:t>22/05/2020</a:t>
             </a:fld>
             <a:endParaRPr lang="en-GB"/>
           </a:p>
@@ -2930,7 +2934,7 @@
           <a:p>
             <a:fld id="{E3393631-F887-443B-9989-5D612862E36C}" type="datetimeFigureOut">
               <a:rPr lang="en-GB" smtClean="0"/>
-              <a:t>16/05/2020</a:t>
+              <a:t>22/05/2020</a:t>
             </a:fld>
             <a:endParaRPr lang="en-GB"/>
           </a:p>
@@ -3392,8 +3396,8 @@
         </p:nvSpPr>
         <p:spPr>
           <a:xfrm>
-            <a:off x="748937" y="647083"/>
-            <a:ext cx="10694125" cy="2308324"/>
+            <a:off x="748937" y="1265392"/>
+            <a:ext cx="10694125" cy="4062651"/>
           </a:xfrm>
           <a:prstGeom prst="rect">
             <a:avLst/>
@@ -3410,6 +3414,19 @@
               <a:rPr lang="en-US" sz="1600" dirty="0">
                 <a:latin typeface="A320 panel font" panose="02000703000000000000" pitchFamily="2" charset="0"/>
               </a:rPr>
+              <a:t>Background: </a:t>
+            </a:r>
+          </a:p>
+          <a:p>
+            <a:endParaRPr lang="en-US" sz="1600" dirty="0">
+              <a:latin typeface="A320 panel font" panose="02000703000000000000" pitchFamily="2" charset="0"/>
+            </a:endParaRPr>
+          </a:p>
+          <a:p>
+            <a:r>
+              <a:rPr lang="en-US" sz="1600" dirty="0">
+                <a:latin typeface="A320 panel font" panose="02000703000000000000" pitchFamily="2" charset="0"/>
+              </a:rPr>
               <a:t>Smoothieware/Smoothieboard does not have an option for using character LCD. It can drive only graphical SPI LCDs.</a:t>
             </a:r>
           </a:p>
@@ -3431,7 +3448,22 @@
               <a:rPr lang="en-US" sz="1600" dirty="0">
                 <a:latin typeface="A320 panel font" panose="02000703000000000000" pitchFamily="2" charset="0"/>
               </a:rPr>
-              <a:t>Smoothieboard developer offers an add-on board, that can translate the SPI bitstream for </a:t>
+              <a:t>Smoothieboard developer offers an add-on board, that can translate the </a:t>
+            </a:r>
+            <a:r>
+              <a:rPr lang="en-US" sz="1600" dirty="0">
+                <a:solidFill>
+                  <a:srgbClr val="0070C0"/>
+                </a:solidFill>
+                <a:latin typeface="A320 panel font" panose="02000703000000000000" pitchFamily="2" charset="0"/>
+              </a:rPr>
+              <a:t>SPI </a:t>
+            </a:r>
+            <a:r>
+              <a:rPr lang="en-US" sz="1600" dirty="0">
+                <a:latin typeface="A320 panel font" panose="02000703000000000000" pitchFamily="2" charset="0"/>
+              </a:rPr>
+              <a:t>bitstream for </a:t>
             </a:r>
           </a:p>
           <a:p>
@@ -3455,10 +3487,17 @@
               <a:rPr lang="en-US" sz="1600" dirty="0">
                 <a:latin typeface="A320 panel font" panose="02000703000000000000" pitchFamily="2" charset="0"/>
               </a:rPr>
-              <a:t>Thee more common parallel LCDs.</a:t>
-            </a:r>
-          </a:p>
-          <a:p>
+              <a:t>The more common </a:t>
+            </a:r>
+            <a:r>
+              <a:rPr lang="en-US" sz="1600" dirty="0">
+                <a:solidFill>
+                  <a:srgbClr val="0070C0"/>
+                </a:solidFill>
+                <a:latin typeface="A320 panel font" panose="02000703000000000000" pitchFamily="2" charset="0"/>
+              </a:rPr>
+              <a:t>PARALLEL LCD</a:t>
+            </a:r>
             <a:endParaRPr lang="en-US" sz="1600" dirty="0">
               <a:latin typeface="A320 panel font" panose="02000703000000000000" pitchFamily="2" charset="0"/>
             </a:endParaRPr>
@@ -3468,7 +3507,23 @@
               <a:rPr lang="en-US" sz="1600" dirty="0">
                 <a:latin typeface="A320 panel font" panose="02000703000000000000" pitchFamily="2" charset="0"/>
               </a:rPr>
-              <a:t>This open source firmware is called Universal Panel Adapter and is available in </a:t>
+              <a:t>This board has a complex shape and fits only on Smoothieboard</a:t>
+            </a:r>
+          </a:p>
+          <a:p>
+            <a:r>
+              <a:rPr lang="en-US" sz="1600" dirty="0">
+                <a:latin typeface="A320 panel font" panose="02000703000000000000" pitchFamily="2" charset="0"/>
+              </a:rPr>
+              <a:t>But</a:t>
+            </a:r>
+          </a:p>
+          <a:p>
+            <a:r>
+              <a:rPr lang="en-US" sz="1600" dirty="0">
+                <a:latin typeface="A320 panel font" panose="02000703000000000000" pitchFamily="2" charset="0"/>
+              </a:rPr>
+              <a:t>The firmware is open source, called Universal Panel Adapter (UPA), is available in </a:t>
             </a:r>
             <a:r>
               <a:rPr lang="en-US" sz="1600" dirty="0" err="1">
@@ -3480,7 +3535,53 @@
               <a:rPr lang="en-US" sz="1600" dirty="0">
                 <a:latin typeface="A320 panel font" panose="02000703000000000000" pitchFamily="2" charset="0"/>
               </a:rPr>
-              <a:t> and can be used with atMega328 microprocessor and Arduino boards.</a:t>
+              <a:t> </a:t>
+            </a:r>
+          </a:p>
+          <a:p>
+            <a:r>
+              <a:rPr lang="en-US" sz="1600" dirty="0">
+                <a:latin typeface="A320 panel font" panose="02000703000000000000" pitchFamily="2" charset="0"/>
+              </a:rPr>
+              <a:t>and </a:t>
+            </a:r>
+          </a:p>
+          <a:p>
+            <a:r>
+              <a:rPr lang="en-US" sz="1600" dirty="0">
+                <a:latin typeface="A320 panel font" panose="02000703000000000000" pitchFamily="2" charset="0"/>
+              </a:rPr>
+              <a:t>can be used with  Arduino boards or plain ATmega328 microprocessor. </a:t>
+            </a:r>
+          </a:p>
+          <a:p>
+            <a:endParaRPr lang="en-US" sz="1600" dirty="0">
+              <a:latin typeface="A320 panel font" panose="02000703000000000000" pitchFamily="2" charset="0"/>
+            </a:endParaRPr>
+          </a:p>
+          <a:p>
+            <a:r>
+              <a:rPr lang="en-US" sz="1600" dirty="0">
+                <a:latin typeface="A320 panel font" panose="02000703000000000000" pitchFamily="2" charset="0"/>
+              </a:rPr>
+              <a:t>On this mini project </a:t>
+            </a:r>
+            <a:r>
+              <a:rPr lang="en-IE" sz="1600" dirty="0">
+                <a:latin typeface="A320 panel font" panose="02000703000000000000" pitchFamily="2" charset="0"/>
+                <a:hlinkClick r:id="rId2"/>
+              </a:rPr>
+              <a:t>https://github.com/nikoschalikias/firm-universal-panel-adapter </a:t>
+            </a:r>
+            <a:r>
+              <a:rPr lang="en-IE" sz="1600" dirty="0"/>
+              <a:t> </a:t>
+            </a:r>
+            <a:r>
+              <a:rPr lang="en-US" sz="1600" dirty="0">
+                <a:latin typeface="A320 panel font" panose="02000703000000000000" pitchFamily="2" charset="0"/>
+              </a:rPr>
+              <a:t>we deploy UPA firmware on a minimal and tidy implementation, to be used with n-PRO-3DP </a:t>
             </a:r>
             <a:endParaRPr lang="en-IE" sz="1600" dirty="0">
               <a:latin typeface="A320 panel font" panose="02000703000000000000" pitchFamily="2" charset="0"/>
@@ -3503,7 +3604,7 @@
         <p:spPr>
           <a:xfrm>
             <a:off x="748937" y="6210917"/>
-            <a:ext cx="3985386" cy="461665"/>
+            <a:ext cx="3985386" cy="646331"/>
           </a:xfrm>
           <a:prstGeom prst="rect">
             <a:avLst/>
@@ -3514,34 +3615,6 @@
             <a:spAutoFit/>
           </a:bodyPr>
           <a:lstStyle/>
-          <a:p>
-            <a:r>
-              <a:rPr lang="en-IE" sz="1200" dirty="0">
-                <a:solidFill>
-                  <a:schemeClr val="accent1">
-                    <a:lumMod val="75000"/>
-                  </a:schemeClr>
-                </a:solidFill>
-                <a:latin typeface="A320 panel font" panose="02000703000000000000" pitchFamily="2" charset="0"/>
-                <a:hlinkClick r:id="rId2">
-                  <a:extLst>
-                    <a:ext uri="{A12FA001-AC4F-418D-AE19-62706E023703}">
-                      <ahyp:hlinkClr xmlns:ahyp="http://schemas.microsoft.com/office/drawing/2018/hyperlinkcolor" val="tx"/>
-                    </a:ext>
-                  </a:extLst>
-                </a:hlinkClick>
-              </a:rPr>
-              <a:t>https://github.com/wolfmanjm/universal-panel-adapter</a:t>
-            </a:r>
-            <a:endParaRPr lang="en-IE" sz="1200" dirty="0">
-              <a:solidFill>
-                <a:schemeClr val="accent1">
-                  <a:lumMod val="75000"/>
-                </a:schemeClr>
-              </a:solidFill>
-              <a:latin typeface="A320 panel font" panose="02000703000000000000" pitchFamily="2" charset="0"/>
-            </a:endParaRPr>
-          </a:p>
           <a:p>
             <a:r>
               <a:rPr lang="en-IE" sz="1200" dirty="0">
@@ -3559,7 +3632,7 @@
                   </a:extLst>
                 </a:hlinkClick>
               </a:rPr>
-              <a:t>http://smoothieware.org/panel</a:t>
+              <a:t>https://github.com/wolfmanjm/universal-panel-adapter</a:t>
             </a:r>
             <a:endParaRPr lang="en-IE" sz="1200" dirty="0">
               <a:solidFill>
@@ -3569,6 +3642,91 @@
               </a:solidFill>
               <a:latin typeface="A320 panel font" panose="02000703000000000000" pitchFamily="2" charset="0"/>
             </a:endParaRPr>
+          </a:p>
+          <a:p>
+            <a:r>
+              <a:rPr lang="en-IE" sz="1200" dirty="0">
+                <a:solidFill>
+                  <a:schemeClr val="accent1">
+                    <a:lumMod val="75000"/>
+                  </a:schemeClr>
+                </a:solidFill>
+                <a:latin typeface="A320 panel font" panose="02000703000000000000" pitchFamily="2" charset="0"/>
+                <a:hlinkClick r:id="rId4">
+                  <a:extLst>
+                    <a:ext uri="{A12FA001-AC4F-418D-AE19-62706E023703}">
+                      <ahyp:hlinkClr xmlns:ahyp="http://schemas.microsoft.com/office/drawing/2018/hyperlinkcolor" val="tx"/>
+                    </a:ext>
+                  </a:extLst>
+                </a:hlinkClick>
+              </a:rPr>
+              <a:t>http://smoothieware.org/panel</a:t>
+            </a:r>
+            <a:endParaRPr lang="en-IE" sz="1200" dirty="0">
+              <a:solidFill>
+                <a:schemeClr val="accent1">
+                  <a:lumMod val="75000"/>
+                </a:schemeClr>
+              </a:solidFill>
+              <a:latin typeface="A320 panel font" panose="02000703000000000000" pitchFamily="2" charset="0"/>
+            </a:endParaRPr>
+          </a:p>
+          <a:p>
+            <a:r>
+              <a:rPr lang="en-IE" sz="1200" dirty="0">
+                <a:solidFill>
+                  <a:schemeClr val="accent1">
+                    <a:lumMod val="75000"/>
+                  </a:schemeClr>
+                </a:solidFill>
+                <a:latin typeface="A320 panel font" panose="02000703000000000000" pitchFamily="2" charset="0"/>
+              </a:rPr>
+              <a:t>n-blocks.net/</a:t>
+            </a:r>
+            <a:r>
+              <a:rPr lang="en-IE" sz="1200" dirty="0" err="1">
+                <a:solidFill>
+                  <a:schemeClr val="accent1">
+                    <a:lumMod val="75000"/>
+                  </a:schemeClr>
+                </a:solidFill>
+                <a:latin typeface="A320 panel font" panose="02000703000000000000" pitchFamily="2" charset="0"/>
+              </a:rPr>
+              <a:t>nmodules</a:t>
+            </a:r>
+            <a:r>
+              <a:rPr lang="en-IE" sz="1200" dirty="0">
+                <a:solidFill>
+                  <a:schemeClr val="accent1">
+                    <a:lumMod val="75000"/>
+                  </a:schemeClr>
+                </a:solidFill>
+                <a:latin typeface="A320 panel font" panose="02000703000000000000" pitchFamily="2" charset="0"/>
+              </a:rPr>
+              <a:t>/</a:t>
+            </a:r>
+            <a:r>
+              <a:rPr lang="en-IE" sz="1200" dirty="0" err="1">
+                <a:solidFill>
+                  <a:schemeClr val="accent1">
+                    <a:lumMod val="75000"/>
+                  </a:schemeClr>
+                </a:solidFill>
+                <a:latin typeface="A320 panel font" panose="02000703000000000000" pitchFamily="2" charset="0"/>
+              </a:rPr>
+              <a:t>doku.php?id</a:t>
+            </a:r>
+            <a:r>
+              <a:rPr lang="en-IE" sz="1200" dirty="0">
+                <a:solidFill>
+                  <a:schemeClr val="accent1">
+                    <a:lumMod val="75000"/>
+                  </a:schemeClr>
+                </a:solidFill>
+                <a:latin typeface="A320 panel font" panose="02000703000000000000" pitchFamily="2" charset="0"/>
+              </a:rPr>
+              <a:t>=nblocks:ni-pro-3dp</a:t>
+            </a:r>
           </a:p>
         </p:txBody>
       </p:sp>
@@ -3602,12 +3760,156 @@
           <a:chExt cx="0" cy="0"/>
         </a:xfrm>
       </p:grpSpPr>
+      <p:sp>
+        <p:nvSpPr>
+          <p:cNvPr id="6" name="Rectangle 5">
+            <a:extLst>
+              <a:ext uri="{FF2B5EF4-FFF2-40B4-BE49-F238E27FC236}">
+                <a16:creationId xmlns:a16="http://schemas.microsoft.com/office/drawing/2014/main" id="{C008DD6D-0FD7-4756-9F9A-EB36FF92EB49}"/>
+              </a:ext>
+            </a:extLst>
+          </p:cNvPr>
+          <p:cNvSpPr/>
+          <p:nvPr/>
+        </p:nvSpPr>
+        <p:spPr>
+          <a:xfrm>
+            <a:off x="0" y="0"/>
+            <a:ext cx="12192000" cy="646331"/>
+          </a:xfrm>
+          <a:prstGeom prst="rect">
+            <a:avLst/>
+          </a:prstGeom>
+        </p:spPr>
+        <p:txBody>
+          <a:bodyPr wrap="square">
+            <a:spAutoFit/>
+          </a:bodyPr>
+          <a:lstStyle/>
+          <a:p>
+            <a:pPr algn="ctr"/>
+            <a:r>
+              <a:rPr lang="en-GB" b="1" dirty="0">
+                <a:latin typeface="A320 panel font" panose="02000703000000000000" pitchFamily="2" charset="0"/>
+              </a:rPr>
+              <a:t>n-PRO-3DP: </a:t>
+            </a:r>
+            <a:r>
+              <a:rPr lang="en-US" b="1" dirty="0">
+                <a:latin typeface="A320 panel font" panose="02000703000000000000" pitchFamily="2" charset="0"/>
+              </a:rPr>
+              <a:t>Universal-Panel-Adapter Firmware in Arduino Nano</a:t>
+            </a:r>
+          </a:p>
+          <a:p>
+            <a:pPr algn="ctr"/>
+            <a:r>
+              <a:rPr lang="en-US" b="1" dirty="0">
+                <a:latin typeface="A320 panel font" panose="02000703000000000000" pitchFamily="2" charset="0"/>
+              </a:rPr>
+              <a:t>Smoothieware can be used with common 4x20 characters LCD</a:t>
+            </a:r>
+          </a:p>
+        </p:txBody>
+      </p:sp>
+      <p:sp>
+        <p:nvSpPr>
+          <p:cNvPr id="5" name="Rectangle 4">
+            <a:extLst>
+              <a:ext uri="{FF2B5EF4-FFF2-40B4-BE49-F238E27FC236}">
+                <a16:creationId xmlns:a16="http://schemas.microsoft.com/office/drawing/2014/main" id="{9A41A44B-9FF7-4BB3-B54B-C67C48698499}"/>
+              </a:ext>
+            </a:extLst>
+          </p:cNvPr>
+          <p:cNvSpPr/>
+          <p:nvPr/>
+        </p:nvSpPr>
+        <p:spPr>
+          <a:xfrm>
+            <a:off x="-9077" y="6150114"/>
+            <a:ext cx="5442516" cy="707886"/>
+          </a:xfrm>
+          <a:prstGeom prst="rect">
+            <a:avLst/>
+          </a:prstGeom>
+        </p:spPr>
+        <p:txBody>
+          <a:bodyPr wrap="none">
+            <a:spAutoFit/>
+          </a:bodyPr>
+          <a:lstStyle/>
+          <a:p>
+            <a:pPr marL="285750" indent="-285750">
+              <a:buFont typeface="Arial" panose="020B0604020202020204" pitchFamily="34" charset="0"/>
+              <a:buChar char="•"/>
+            </a:pPr>
+            <a:r>
+              <a:rPr lang="en-IE" sz="1000" dirty="0">
+                <a:latin typeface="A320 panel font" panose="02000703000000000000" pitchFamily="2" charset="0"/>
+                <a:hlinkClick r:id="rId2"/>
+              </a:rPr>
+              <a:t>https://github.com/nikoschalikias/firm-universal-panel-adapter</a:t>
+            </a:r>
+            <a:endParaRPr lang="en-IE" sz="1000" dirty="0">
+              <a:latin typeface="A320 panel font" panose="02000703000000000000" pitchFamily="2" charset="0"/>
+            </a:endParaRPr>
+          </a:p>
+          <a:p>
+            <a:pPr marL="285750" indent="-285750">
+              <a:buFont typeface="Arial" panose="020B0604020202020204" pitchFamily="34" charset="0"/>
+              <a:buChar char="•"/>
+            </a:pPr>
+            <a:r>
+              <a:rPr lang="en-IE" sz="1000" dirty="0">
+                <a:latin typeface="A320 panel font" panose="02000703000000000000" pitchFamily="2" charset="0"/>
+                <a:hlinkClick r:id="rId3"/>
+              </a:rPr>
+              <a:t>https://github.com/wolfmanjm/universal-panel-adapter</a:t>
+            </a:r>
+            <a:endParaRPr lang="en-IE" sz="1000" dirty="0">
+              <a:latin typeface="A320 panel font" panose="02000703000000000000" pitchFamily="2" charset="0"/>
+            </a:endParaRPr>
+          </a:p>
+          <a:p>
+            <a:pPr marL="285750" indent="-285750">
+              <a:buFont typeface="Arial" panose="020B0604020202020204" pitchFamily="34" charset="0"/>
+              <a:buChar char="•"/>
+            </a:pPr>
+            <a:r>
+              <a:rPr lang="en-IE" sz="1000" dirty="0">
+                <a:latin typeface="A320 panel font" panose="02000703000000000000" pitchFamily="2" charset="0"/>
+                <a:hlinkClick r:id="rId4"/>
+              </a:rPr>
+              <a:t>http://smoothieware.org/panel</a:t>
+            </a:r>
+            <a:endParaRPr lang="en-IE" sz="1000" dirty="0">
+              <a:latin typeface="A320 panel font" panose="02000703000000000000" pitchFamily="2" charset="0"/>
+            </a:endParaRPr>
+          </a:p>
+          <a:p>
+            <a:pPr marL="285750" indent="-285750">
+              <a:buFont typeface="Arial" panose="020B0604020202020204" pitchFamily="34" charset="0"/>
+              <a:buChar char="•"/>
+            </a:pPr>
+            <a:r>
+              <a:rPr lang="en-IE" sz="1000" dirty="0">
+                <a:latin typeface="A320 panel font" panose="02000703000000000000" pitchFamily="2" charset="0"/>
+                <a:hlinkClick r:id="rId5"/>
+              </a:rPr>
+              <a:t>https://stackoverflow.com/questions/42826755/wiring-h-missing-in-arduino/42827754</a:t>
+            </a:r>
+            <a:endParaRPr lang="en-IE" sz="1000" dirty="0">
+              <a:latin typeface="A320 panel font" panose="02000703000000000000" pitchFamily="2" charset="0"/>
+            </a:endParaRPr>
+          </a:p>
+        </p:txBody>
+      </p:sp>
       <p:pic>
         <p:nvPicPr>
-          <p:cNvPr id="3" name="Picture 2">
+          <p:cNvPr id="7" name="Picture 6" descr="A circuit board&#10;&#10;Description automatically generated">
             <a:extLst>
               <a:ext uri="{FF2B5EF4-FFF2-40B4-BE49-F238E27FC236}">
-                <a16:creationId xmlns:a16="http://schemas.microsoft.com/office/drawing/2014/main" id="{6ED1DBE4-82FA-42C0-BA5E-B2D0A6DB4427}"/>
+                <a16:creationId xmlns:a16="http://schemas.microsoft.com/office/drawing/2014/main" id="{9CE5433F-54CC-49A9-9992-862546695313}"/>
               </a:ext>
             </a:extLst>
           </p:cNvPr>
@@ -3617,15 +3919,21 @@
           <p:nvPr/>
         </p:nvPicPr>
         <p:blipFill>
-          <a:blip r:embed="rId2"/>
+          <a:blip r:embed="rId6">
+            <a:extLst>
+              <a:ext uri="{28A0092B-C50C-407E-A947-70E740481C1C}">
+                <a14:useLocalDpi xmlns:a14="http://schemas.microsoft.com/office/drawing/2010/main" val="0"/>
+              </a:ext>
+            </a:extLst>
+          </a:blip>
           <a:stretch>
             <a:fillRect/>
           </a:stretch>
         </p:blipFill>
         <p:spPr>
           <a:xfrm>
-            <a:off x="670836" y="645189"/>
-            <a:ext cx="4640683" cy="5539079"/>
+            <a:off x="747838" y="631211"/>
+            <a:ext cx="4624199" cy="5505450"/>
           </a:xfrm>
           <a:prstGeom prst="rect">
             <a:avLst/>
@@ -3634,10 +3942,10 @@
       </p:pic>
       <p:pic>
         <p:nvPicPr>
-          <p:cNvPr id="4" name="Picture 3">
+          <p:cNvPr id="9" name="Picture 8" descr="A circuit board&#10;&#10;Description automatically generated">
             <a:extLst>
               <a:ext uri="{FF2B5EF4-FFF2-40B4-BE49-F238E27FC236}">
-                <a16:creationId xmlns:a16="http://schemas.microsoft.com/office/drawing/2014/main" id="{B9E0C13A-6FBB-4398-8A91-E108186CAAA1}"/>
+                <a16:creationId xmlns:a16="http://schemas.microsoft.com/office/drawing/2014/main" id="{7E2CE054-B6FF-421D-A7FE-DB09B7183F83}"/>
               </a:ext>
             </a:extLst>
           </p:cNvPr>
@@ -3647,21 +3955,118 @@
           <p:nvPr/>
         </p:nvPicPr>
         <p:blipFill>
-          <a:blip r:embed="rId3"/>
+          <a:blip r:embed="rId7">
+            <a:extLst>
+              <a:ext uri="{28A0092B-C50C-407E-A947-70E740481C1C}">
+                <a14:useLocalDpi xmlns:a14="http://schemas.microsoft.com/office/drawing/2010/main" val="0"/>
+              </a:ext>
+            </a:extLst>
+          </a:blip>
           <a:stretch>
             <a:fillRect/>
           </a:stretch>
         </p:blipFill>
         <p:spPr>
           <a:xfrm>
-            <a:off x="5591179" y="645189"/>
-            <a:ext cx="6015490" cy="5504925"/>
+            <a:off x="5714451" y="631210"/>
+            <a:ext cx="6019800" cy="5505450"/>
           </a:xfrm>
           <a:prstGeom prst="rect">
             <a:avLst/>
           </a:prstGeom>
         </p:spPr>
       </p:pic>
+      <p:sp>
+        <p:nvSpPr>
+          <p:cNvPr id="2" name="Rectangle: Rounded Corners 1">
+            <a:extLst>
+              <a:ext uri="{FF2B5EF4-FFF2-40B4-BE49-F238E27FC236}">
+                <a16:creationId xmlns:a16="http://schemas.microsoft.com/office/drawing/2014/main" id="{B4B7F08C-F8BE-4A0D-BE0E-A3FFA8F54C92}"/>
+              </a:ext>
+            </a:extLst>
+          </p:cNvPr>
+          <p:cNvSpPr/>
+          <p:nvPr/>
+        </p:nvSpPr>
+        <p:spPr>
+          <a:xfrm>
+            <a:off x="6399162" y="6254421"/>
+            <a:ext cx="4650377" cy="499271"/>
+          </a:xfrm>
+          <a:prstGeom prst="roundRect">
+            <a:avLst/>
+          </a:prstGeom>
+          <a:solidFill>
+            <a:srgbClr val="FFC000"/>
+          </a:solidFill>
+        </p:spPr>
+        <p:style>
+          <a:lnRef idx="2">
+            <a:schemeClr val="accent1">
+              <a:shade val="50000"/>
+            </a:schemeClr>
+          </a:lnRef>
+          <a:fillRef idx="1">
+            <a:schemeClr val="accent1"/>
+          </a:fillRef>
+          <a:effectRef idx="0">
+            <a:schemeClr val="accent1"/>
+          </a:effectRef>
+          <a:fontRef idx="minor">
+            <a:schemeClr val="lt1"/>
+          </a:fontRef>
+        </p:style>
+        <p:txBody>
+          <a:bodyPr rtlCol="0" anchor="ctr"/>
+          <a:lstStyle/>
+          <a:p>
+            <a:pPr algn="ctr"/>
+            <a:r>
+              <a:rPr lang="en-US" dirty="0">
+                <a:solidFill>
+                  <a:schemeClr val="tx1"/>
+                </a:solidFill>
+              </a:rPr>
+              <a:t>NEXT: Minimal Implementation on 43x33mm Perforated board</a:t>
+            </a:r>
+            <a:endParaRPr lang="en-IE" dirty="0">
+              <a:solidFill>
+                <a:schemeClr val="tx1"/>
+              </a:solidFill>
+            </a:endParaRPr>
+          </a:p>
+        </p:txBody>
+      </p:sp>
+    </p:spTree>
+    <p:extLst>
+      <p:ext uri="{BB962C8B-B14F-4D97-AF65-F5344CB8AC3E}">
+        <p14:creationId xmlns:p14="http://schemas.microsoft.com/office/powerpoint/2010/main" val="3016690355"/>
+      </p:ext>
+    </p:extLst>
+  </p:cSld>
+  <p:clrMapOvr>
+    <a:masterClrMapping/>
+  </p:clrMapOvr>
+</p:sld>
+</file>
+
+<file path=ppt/slides/slide3.xml><?xml version="1.0" encoding="utf-8"?>
+<p:sld xmlns:a="http://schemas.openxmlformats.org/drawingml/2006/main" xmlns:r="http://schemas.openxmlformats.org/officeDocument/2006/relationships" xmlns:p="http://schemas.openxmlformats.org/presentationml/2006/main">
+  <p:cSld>
+    <p:spTree>
+      <p:nvGrpSpPr>
+        <p:cNvPr id="1" name=""/>
+        <p:cNvGrpSpPr/>
+        <p:nvPr/>
+      </p:nvGrpSpPr>
+      <p:grpSpPr>
+        <a:xfrm>
+          <a:off x="0" y="0"/>
+          <a:ext cx="0" cy="0"/>
+          <a:chOff x="0" y="0"/>
+          <a:chExt cx="0" cy="0"/>
+        </a:xfrm>
+      </p:grpSpPr>
       <p:sp>
         <p:nvSpPr>
           <p:cNvPr id="6" name="Rectangle 5">
@@ -3700,7 +4105,7 @@
               <a:rPr lang="en-US" b="1" dirty="0">
                 <a:latin typeface="A320 panel font" panose="02000703000000000000" pitchFamily="2" charset="0"/>
               </a:rPr>
-              <a:t>Universal-Panel-Adapter Firmware in Arduino Nano</a:t>
+              <a:t>Universal-Panel-Adapter</a:t>
             </a:r>
           </a:p>
           <a:p>
@@ -3709,17 +4114,140 @@
               <a:rPr lang="en-US" b="1" dirty="0">
                 <a:latin typeface="A320 panel font" panose="02000703000000000000" pitchFamily="2" charset="0"/>
               </a:rPr>
-              <a:t>Smoothieware can be used with common 4x20 characters LCD</a:t>
-            </a:r>
-          </a:p>
-        </p:txBody>
-      </p:sp>
-      <p:sp>
-        <p:nvSpPr>
-          <p:cNvPr id="5" name="Rectangle 4">
+              <a:t>Arduino hex</a:t>
+            </a:r>
+          </a:p>
+        </p:txBody>
+      </p:sp>
+      <p:pic>
+        <p:nvPicPr>
+          <p:cNvPr id="7" name="Picture 6" descr="A screenshot of a social media post&#10;&#10;Description automatically generated">
             <a:extLst>
               <a:ext uri="{FF2B5EF4-FFF2-40B4-BE49-F238E27FC236}">
-                <a16:creationId xmlns:a16="http://schemas.microsoft.com/office/drawing/2014/main" id="{9A41A44B-9FF7-4BB3-B54B-C67C48698499}"/>
+                <a16:creationId xmlns:a16="http://schemas.microsoft.com/office/drawing/2014/main" id="{4F1BA70A-4866-4623-8EC8-8F4BAD7C63BB}"/>
+              </a:ext>
+            </a:extLst>
+          </p:cNvPr>
+          <p:cNvPicPr>
+            <a:picLocks noChangeAspect="1"/>
+          </p:cNvPicPr>
+          <p:nvPr/>
+        </p:nvPicPr>
+        <p:blipFill>
+          <a:blip r:embed="rId2">
+            <a:extLst>
+              <a:ext uri="{28A0092B-C50C-407E-A947-70E740481C1C}">
+                <a14:useLocalDpi xmlns:a14="http://schemas.microsoft.com/office/drawing/2010/main" val="0"/>
+              </a:ext>
+            </a:extLst>
+          </a:blip>
+          <a:stretch>
+            <a:fillRect/>
+          </a:stretch>
+        </p:blipFill>
+        <p:spPr>
+          <a:xfrm>
+            <a:off x="1633946" y="1840885"/>
+            <a:ext cx="8276408" cy="5017115"/>
+          </a:xfrm>
+          <a:prstGeom prst="rect">
+            <a:avLst/>
+          </a:prstGeom>
+        </p:spPr>
+      </p:pic>
+      <p:sp>
+        <p:nvSpPr>
+          <p:cNvPr id="8" name="TextBox 7">
+            <a:extLst>
+              <a:ext uri="{FF2B5EF4-FFF2-40B4-BE49-F238E27FC236}">
+                <a16:creationId xmlns:a16="http://schemas.microsoft.com/office/drawing/2014/main" id="{56461EF5-5B8D-4D08-AF01-29620D1EB5F0}"/>
+              </a:ext>
+            </a:extLst>
+          </p:cNvPr>
+          <p:cNvSpPr txBox="1"/>
+          <p:nvPr/>
+        </p:nvSpPr>
+        <p:spPr>
+          <a:xfrm>
+            <a:off x="1619794" y="931817"/>
+            <a:ext cx="5287025" cy="646331"/>
+          </a:xfrm>
+          <a:prstGeom prst="rect">
+            <a:avLst/>
+          </a:prstGeom>
+          <a:noFill/>
+        </p:spPr>
+        <p:txBody>
+          <a:bodyPr wrap="none" rtlCol="0">
+            <a:spAutoFit/>
+          </a:bodyPr>
+          <a:lstStyle/>
+          <a:p>
+            <a:r>
+              <a:rPr lang="en-US" dirty="0">
+                <a:latin typeface="A320 panel font" panose="02000703000000000000" pitchFamily="2" charset="0"/>
+              </a:rPr>
+              <a:t>From Arduino IDE : </a:t>
+            </a:r>
+            <a:r>
+              <a:rPr lang="en-US" dirty="0">
+                <a:solidFill>
+                  <a:srgbClr val="00B050"/>
+                </a:solidFill>
+                <a:latin typeface="A320 panel font" panose="02000703000000000000" pitchFamily="2" charset="0"/>
+              </a:rPr>
+              <a:t>Sketch: Export compiled Binary</a:t>
+            </a:r>
+          </a:p>
+          <a:p>
+            <a:r>
+              <a:rPr lang="en-US" dirty="0">
+                <a:latin typeface="A320 panel font" panose="02000703000000000000" pitchFamily="2" charset="0"/>
+              </a:rPr>
+              <a:t>This creates 4 hex files as below:</a:t>
+            </a:r>
+            <a:endParaRPr lang="en-IE" dirty="0">
+              <a:latin typeface="A320 panel font" panose="02000703000000000000" pitchFamily="2" charset="0"/>
+            </a:endParaRPr>
+          </a:p>
+        </p:txBody>
+      </p:sp>
+    </p:spTree>
+    <p:extLst>
+      <p:ext uri="{BB962C8B-B14F-4D97-AF65-F5344CB8AC3E}">
+        <p14:creationId xmlns:p14="http://schemas.microsoft.com/office/powerpoint/2010/main" val="481960972"/>
+      </p:ext>
+    </p:extLst>
+  </p:cSld>
+  <p:clrMapOvr>
+    <a:masterClrMapping/>
+  </p:clrMapOvr>
+</p:sld>
+</file>
+
+<file path=ppt/slides/slide4.xml><?xml version="1.0" encoding="utf-8"?>
+<p:sld xmlns:a="http://schemas.openxmlformats.org/drawingml/2006/main" xmlns:r="http://schemas.openxmlformats.org/officeDocument/2006/relationships" xmlns:p="http://schemas.openxmlformats.org/presentationml/2006/main">
+  <p:cSld>
+    <p:spTree>
+      <p:nvGrpSpPr>
+        <p:cNvPr id="1" name=""/>
+        <p:cNvGrpSpPr/>
+        <p:nvPr/>
+      </p:nvGrpSpPr>
+      <p:grpSpPr>
+        <a:xfrm>
+          <a:off x="0" y="0"/>
+          <a:ext cx="0" cy="0"/>
+          <a:chOff x="0" y="0"/>
+          <a:chExt cx="0" cy="0"/>
+        </a:xfrm>
+      </p:grpSpPr>
+      <p:sp>
+        <p:nvSpPr>
+          <p:cNvPr id="6" name="Rectangle 5">
+            <a:extLst>
+              <a:ext uri="{FF2B5EF4-FFF2-40B4-BE49-F238E27FC236}">
+                <a16:creationId xmlns:a16="http://schemas.microsoft.com/office/drawing/2014/main" id="{C008DD6D-0FD7-4756-9F9A-EB36FF92EB49}"/>
               </a:ext>
             </a:extLst>
           </p:cNvPr>
@@ -3728,88 +4256,320 @@
         </p:nvSpPr>
         <p:spPr>
           <a:xfrm>
-            <a:off x="-9077" y="6150114"/>
-            <a:ext cx="5442516" cy="707886"/>
+            <a:off x="0" y="0"/>
+            <a:ext cx="12192000" cy="646331"/>
           </a:xfrm>
           <a:prstGeom prst="rect">
             <a:avLst/>
           </a:prstGeom>
         </p:spPr>
         <p:txBody>
-          <a:bodyPr wrap="none">
+          <a:bodyPr wrap="square">
             <a:spAutoFit/>
           </a:bodyPr>
           <a:lstStyle/>
           <a:p>
-            <a:pPr marL="285750" indent="-285750">
-              <a:buFont typeface="Arial" panose="020B0604020202020204" pitchFamily="34" charset="0"/>
-              <a:buChar char="•"/>
-            </a:pPr>
-            <a:r>
-              <a:rPr lang="en-IE" sz="1000" dirty="0">
+            <a:pPr algn="ctr"/>
+            <a:r>
+              <a:rPr lang="en-GB" b="1" dirty="0">
                 <a:latin typeface="A320 panel font" panose="02000703000000000000" pitchFamily="2" charset="0"/>
-                <a:hlinkClick r:id="rId4"/>
               </a:rPr>
-              <a:t>https://github.com/nikoschalikias/firm-universal-panel-adapter</a:t>
-            </a:r>
-            <a:endParaRPr lang="en-IE" sz="1000" dirty="0">
-              <a:latin typeface="A320 panel font" panose="02000703000000000000" pitchFamily="2" charset="0"/>
-            </a:endParaRPr>
-          </a:p>
-          <a:p>
-            <a:pPr marL="285750" indent="-285750">
-              <a:buFont typeface="Arial" panose="020B0604020202020204" pitchFamily="34" charset="0"/>
-              <a:buChar char="•"/>
-            </a:pPr>
-            <a:r>
-              <a:rPr lang="en-IE" sz="1000" dirty="0">
+              <a:t>n-PRO-3DP: </a:t>
+            </a:r>
+            <a:r>
+              <a:rPr lang="en-US" b="1" dirty="0">
                 <a:latin typeface="A320 panel font" panose="02000703000000000000" pitchFamily="2" charset="0"/>
-                <a:hlinkClick r:id="rId5"/>
               </a:rPr>
-              <a:t>https://github.com/wolfmanjm/universal-panel-adapter</a:t>
-            </a:r>
-            <a:endParaRPr lang="en-IE" sz="1000" dirty="0">
-              <a:latin typeface="A320 panel font" panose="02000703000000000000" pitchFamily="2" charset="0"/>
-            </a:endParaRPr>
-          </a:p>
-          <a:p>
-            <a:pPr marL="285750" indent="-285750">
-              <a:buFont typeface="Arial" panose="020B0604020202020204" pitchFamily="34" charset="0"/>
-              <a:buChar char="•"/>
-            </a:pPr>
-            <a:r>
-              <a:rPr lang="en-IE" sz="1000" dirty="0">
+              <a:t>Universal-Panel-Adapter</a:t>
+            </a:r>
+          </a:p>
+          <a:p>
+            <a:pPr algn="ctr"/>
+            <a:r>
+              <a:rPr lang="en-US" b="1" dirty="0">
                 <a:latin typeface="A320 panel font" panose="02000703000000000000" pitchFamily="2" charset="0"/>
-                <a:hlinkClick r:id="rId6"/>
               </a:rPr>
-              <a:t>http://smoothieware.org/panel</a:t>
-            </a:r>
-            <a:endParaRPr lang="en-IE" sz="1000" dirty="0">
-              <a:latin typeface="A320 panel font" panose="02000703000000000000" pitchFamily="2" charset="0"/>
-            </a:endParaRPr>
-          </a:p>
-          <a:p>
-            <a:pPr marL="285750" indent="-285750">
-              <a:buFont typeface="Arial" panose="020B0604020202020204" pitchFamily="34" charset="0"/>
-              <a:buChar char="•"/>
-            </a:pPr>
-            <a:r>
-              <a:rPr lang="en-IE" sz="1000" dirty="0">
-                <a:latin typeface="A320 panel font" panose="02000703000000000000" pitchFamily="2" charset="0"/>
-                <a:hlinkClick r:id="rId7"/>
-              </a:rPr>
-              <a:t>https://stackoverflow.com/questions/42826755/wiring-h-missing-in-arduino/42827754</a:t>
-            </a:r>
-            <a:endParaRPr lang="en-IE" sz="1000" dirty="0">
-              <a:latin typeface="A320 panel font" panose="02000703000000000000" pitchFamily="2" charset="0"/>
-            </a:endParaRPr>
-          </a:p>
-        </p:txBody>
-      </p:sp>
+              <a:t>Minimal Implementation Block Diagram</a:t>
+            </a:r>
+          </a:p>
+        </p:txBody>
+      </p:sp>
+      <p:pic>
+        <p:nvPicPr>
+          <p:cNvPr id="8" name="Picture 7" descr="A screenshot of a cell phone&#10;&#10;Description automatically generated">
+            <a:extLst>
+              <a:ext uri="{FF2B5EF4-FFF2-40B4-BE49-F238E27FC236}">
+                <a16:creationId xmlns:a16="http://schemas.microsoft.com/office/drawing/2014/main" id="{D47FD165-7035-49A2-93B3-6E372C3362D4}"/>
+              </a:ext>
+            </a:extLst>
+          </p:cNvPr>
+          <p:cNvPicPr>
+            <a:picLocks noChangeAspect="1"/>
+          </p:cNvPicPr>
+          <p:nvPr/>
+        </p:nvPicPr>
+        <p:blipFill>
+          <a:blip r:embed="rId2">
+            <a:extLst>
+              <a:ext uri="{28A0092B-C50C-407E-A947-70E740481C1C}">
+                <a14:useLocalDpi xmlns:a14="http://schemas.microsoft.com/office/drawing/2010/main" val="0"/>
+              </a:ext>
+            </a:extLst>
+          </a:blip>
+          <a:stretch>
+            <a:fillRect/>
+          </a:stretch>
+        </p:blipFill>
+        <p:spPr>
+          <a:xfrm>
+            <a:off x="3301329" y="646331"/>
+            <a:ext cx="5589341" cy="6133436"/>
+          </a:xfrm>
+          <a:prstGeom prst="rect">
+            <a:avLst/>
+          </a:prstGeom>
+        </p:spPr>
+      </p:pic>
     </p:spTree>
     <p:extLst>
       <p:ext uri="{BB962C8B-B14F-4D97-AF65-F5344CB8AC3E}">
         <p14:creationId xmlns:p14="http://schemas.microsoft.com/office/powerpoint/2010/main" val="1150983757"/>
+      </p:ext>
+    </p:extLst>
+  </p:cSld>
+  <p:clrMapOvr>
+    <a:masterClrMapping/>
+  </p:clrMapOvr>
+</p:sld>
+</file>
+
+<file path=ppt/slides/slide5.xml><?xml version="1.0" encoding="utf-8"?>
+<p:sld xmlns:a="http://schemas.openxmlformats.org/drawingml/2006/main" xmlns:r="http://schemas.openxmlformats.org/officeDocument/2006/relationships" xmlns:p="http://schemas.openxmlformats.org/presentationml/2006/main">
+  <p:cSld>
+    <p:spTree>
+      <p:nvGrpSpPr>
+        <p:cNvPr id="1" name=""/>
+        <p:cNvGrpSpPr/>
+        <p:nvPr/>
+      </p:nvGrpSpPr>
+      <p:grpSpPr>
+        <a:xfrm>
+          <a:off x="0" y="0"/>
+          <a:ext cx="0" cy="0"/>
+          <a:chOff x="0" y="0"/>
+          <a:chExt cx="0" cy="0"/>
+        </a:xfrm>
+      </p:grpSpPr>
+      <p:sp>
+        <p:nvSpPr>
+          <p:cNvPr id="6" name="Rectangle 5">
+            <a:extLst>
+              <a:ext uri="{FF2B5EF4-FFF2-40B4-BE49-F238E27FC236}">
+                <a16:creationId xmlns:a16="http://schemas.microsoft.com/office/drawing/2014/main" id="{C008DD6D-0FD7-4756-9F9A-EB36FF92EB49}"/>
+              </a:ext>
+            </a:extLst>
+          </p:cNvPr>
+          <p:cNvSpPr/>
+          <p:nvPr/>
+        </p:nvSpPr>
+        <p:spPr>
+          <a:xfrm>
+            <a:off x="0" y="0"/>
+            <a:ext cx="12192000" cy="646331"/>
+          </a:xfrm>
+          <a:prstGeom prst="rect">
+            <a:avLst/>
+          </a:prstGeom>
+        </p:spPr>
+        <p:txBody>
+          <a:bodyPr wrap="square">
+            <a:spAutoFit/>
+          </a:bodyPr>
+          <a:lstStyle/>
+          <a:p>
+            <a:pPr algn="ctr"/>
+            <a:r>
+              <a:rPr lang="en-GB" b="1" dirty="0">
+                <a:latin typeface="A320 panel font" panose="02000703000000000000" pitchFamily="2" charset="0"/>
+              </a:rPr>
+              <a:t>n-PRO-3DP: </a:t>
+            </a:r>
+            <a:r>
+              <a:rPr lang="en-US" b="1" dirty="0">
+                <a:latin typeface="A320 panel font" panose="02000703000000000000" pitchFamily="2" charset="0"/>
+              </a:rPr>
+              <a:t>Universal-Panel-Adapter</a:t>
+            </a:r>
+          </a:p>
+          <a:p>
+            <a:pPr algn="ctr"/>
+            <a:r>
+              <a:rPr lang="en-US" b="1" dirty="0">
+                <a:latin typeface="A320 panel font" panose="02000703000000000000" pitchFamily="2" charset="0"/>
+              </a:rPr>
+              <a:t>Minimal Schematic for Dual In Line ATmega328</a:t>
+            </a:r>
+          </a:p>
+        </p:txBody>
+      </p:sp>
+      <p:pic>
+        <p:nvPicPr>
+          <p:cNvPr id="5" name="Picture 4">
+            <a:extLst>
+              <a:ext uri="{FF2B5EF4-FFF2-40B4-BE49-F238E27FC236}">
+                <a16:creationId xmlns:a16="http://schemas.microsoft.com/office/drawing/2014/main" id="{084B61C6-1281-4390-92C4-AB5DD7411001}"/>
+              </a:ext>
+            </a:extLst>
+          </p:cNvPr>
+          <p:cNvPicPr>
+            <a:picLocks noChangeAspect="1"/>
+          </p:cNvPicPr>
+          <p:nvPr/>
+        </p:nvPicPr>
+        <p:blipFill>
+          <a:blip r:embed="rId2">
+            <a:extLst>
+              <a:ext uri="{28A0092B-C50C-407E-A947-70E740481C1C}">
+                <a14:useLocalDpi xmlns:a14="http://schemas.microsoft.com/office/drawing/2010/main" val="0"/>
+              </a:ext>
+            </a:extLst>
+          </a:blip>
+          <a:stretch>
+            <a:fillRect/>
+          </a:stretch>
+        </p:blipFill>
+        <p:spPr>
+          <a:xfrm>
+            <a:off x="1819399" y="634647"/>
+            <a:ext cx="8553201" cy="6223353"/>
+          </a:xfrm>
+          <a:prstGeom prst="rect">
+            <a:avLst/>
+          </a:prstGeom>
+        </p:spPr>
+      </p:pic>
+    </p:spTree>
+    <p:extLst>
+      <p:ext uri="{BB962C8B-B14F-4D97-AF65-F5344CB8AC3E}">
+        <p14:creationId xmlns:p14="http://schemas.microsoft.com/office/powerpoint/2010/main" val="3547334500"/>
+      </p:ext>
+    </p:extLst>
+  </p:cSld>
+  <p:clrMapOvr>
+    <a:masterClrMapping/>
+  </p:clrMapOvr>
+</p:sld>
+</file>
+
+<file path=ppt/slides/slide6.xml><?xml version="1.0" encoding="utf-8"?>
+<p:sld xmlns:a="http://schemas.openxmlformats.org/drawingml/2006/main" xmlns:r="http://schemas.openxmlformats.org/officeDocument/2006/relationships" xmlns:p="http://schemas.openxmlformats.org/presentationml/2006/main">
+  <p:cSld>
+    <p:spTree>
+      <p:nvGrpSpPr>
+        <p:cNvPr id="1" name=""/>
+        <p:cNvGrpSpPr/>
+        <p:nvPr/>
+      </p:nvGrpSpPr>
+      <p:grpSpPr>
+        <a:xfrm>
+          <a:off x="0" y="0"/>
+          <a:ext cx="0" cy="0"/>
+          <a:chOff x="0" y="0"/>
+          <a:chExt cx="0" cy="0"/>
+        </a:xfrm>
+      </p:grpSpPr>
+      <p:sp>
+        <p:nvSpPr>
+          <p:cNvPr id="6" name="Rectangle 5">
+            <a:extLst>
+              <a:ext uri="{FF2B5EF4-FFF2-40B4-BE49-F238E27FC236}">
+                <a16:creationId xmlns:a16="http://schemas.microsoft.com/office/drawing/2014/main" id="{C008DD6D-0FD7-4756-9F9A-EB36FF92EB49}"/>
+              </a:ext>
+            </a:extLst>
+          </p:cNvPr>
+          <p:cNvSpPr/>
+          <p:nvPr/>
+        </p:nvSpPr>
+        <p:spPr>
+          <a:xfrm>
+            <a:off x="0" y="0"/>
+            <a:ext cx="12192000" cy="646331"/>
+          </a:xfrm>
+          <a:prstGeom prst="rect">
+            <a:avLst/>
+          </a:prstGeom>
+        </p:spPr>
+        <p:txBody>
+          <a:bodyPr wrap="square">
+            <a:spAutoFit/>
+          </a:bodyPr>
+          <a:lstStyle/>
+          <a:p>
+            <a:pPr algn="ctr"/>
+            <a:r>
+              <a:rPr lang="en-GB" b="1" dirty="0">
+                <a:latin typeface="A320 panel font" panose="02000703000000000000" pitchFamily="2" charset="0"/>
+              </a:rPr>
+              <a:t>n-PRO-3DP: </a:t>
+            </a:r>
+            <a:r>
+              <a:rPr lang="en-US" b="1" dirty="0">
+                <a:latin typeface="A320 panel font" panose="02000703000000000000" pitchFamily="2" charset="0"/>
+              </a:rPr>
+              <a:t>Universal-Panel-Adapter</a:t>
+            </a:r>
+          </a:p>
+          <a:p>
+            <a:pPr algn="ctr"/>
+            <a:r>
+              <a:rPr lang="en-US" b="1" dirty="0">
+                <a:latin typeface="A320 panel font" panose="02000703000000000000" pitchFamily="2" charset="0"/>
+              </a:rPr>
+              <a:t>Minimal Perforated Board</a:t>
+            </a:r>
+          </a:p>
+        </p:txBody>
+      </p:sp>
+      <p:pic>
+        <p:nvPicPr>
+          <p:cNvPr id="3" name="Picture 2" descr="A circuit board&#10;&#10;Description automatically generated">
+            <a:extLst>
+              <a:ext uri="{FF2B5EF4-FFF2-40B4-BE49-F238E27FC236}">
+                <a16:creationId xmlns:a16="http://schemas.microsoft.com/office/drawing/2014/main" id="{8F9EA5F8-DCF7-4E65-8631-1CC05D9498E3}"/>
+              </a:ext>
+            </a:extLst>
+          </p:cNvPr>
+          <p:cNvPicPr>
+            <a:picLocks noChangeAspect="1"/>
+          </p:cNvPicPr>
+          <p:nvPr/>
+        </p:nvPicPr>
+        <p:blipFill>
+          <a:blip r:embed="rId2">
+            <a:extLst>
+              <a:ext uri="{28A0092B-C50C-407E-A947-70E740481C1C}">
+                <a14:useLocalDpi xmlns:a14="http://schemas.microsoft.com/office/drawing/2010/main" val="0"/>
+              </a:ext>
+            </a:extLst>
+          </a:blip>
+          <a:stretch>
+            <a:fillRect/>
+          </a:stretch>
+        </p:blipFill>
+        <p:spPr>
+          <a:xfrm>
+            <a:off x="1785596" y="949233"/>
+            <a:ext cx="8620808" cy="5752011"/>
+          </a:xfrm>
+          <a:prstGeom prst="rect">
+            <a:avLst/>
+          </a:prstGeom>
+        </p:spPr>
+      </p:pic>
+    </p:spTree>
+    <p:extLst>
+      <p:ext uri="{BB962C8B-B14F-4D97-AF65-F5344CB8AC3E}">
+        <p14:creationId xmlns:p14="http://schemas.microsoft.com/office/powerpoint/2010/main" val="3114911138"/>
       </p:ext>
     </p:extLst>
   </p:cSld>

</xml_diff>